<commit_message>
Added attendance badge to COMP270_1 and removed unneeded files
</commit_message>
<xml_diff>
--- a/COMP270/01/2019-20-COMP270-01-lecture-materials.pptx
+++ b/COMP270/01/2019-20-COMP270-01-lecture-materials.pptx
@@ -147,6 +147,9 @@
           </p14:sldIdLst>
         </p14:section>
       </p14:sectionLst>
+    </p:ext>
+    <p:ext uri="{EFAFB233-063F-42B5-8137-9DF3F51BA10A}">
+      <p15:sldGuideLst xmlns:p15="http://schemas.microsoft.com/office/powerpoint/2012/main"/>
     </p:ext>
   </p:extLst>
 </p:presentation>
@@ -396,7 +399,7 @@
           <a:p>
             <a:fld id="{9184DA70-C731-4C70-880D-CCD4705E623C}" type="datetime1">
               <a:rPr lang="en-US" smtClean="0"/>
-              <a:t>9/22/2019</a:t>
+              <a:t>9/23/19</a:t>
             </a:fld>
             <a:endParaRPr lang="en-US" dirty="0"/>
           </a:p>
@@ -584,7 +587,7 @@
           <a:p>
             <a:fld id="{B612A279-0833-481D-8C56-F67FD0AC6C50}" type="datetime1">
               <a:rPr lang="en-US" smtClean="0"/>
-              <a:t>9/22/2019</a:t>
+              <a:t>9/23/19</a:t>
             </a:fld>
             <a:endParaRPr lang="en-US" dirty="0"/>
           </a:p>
@@ -826,7 +829,7 @@
           <a:p>
             <a:fld id="{6587DA83-5663-4C9C-B9AA-0B40A3DAFF81}" type="datetime1">
               <a:rPr lang="en-US" smtClean="0"/>
-              <a:t>9/22/2019</a:t>
+              <a:t>9/23/19</a:t>
             </a:fld>
             <a:endParaRPr lang="en-US" dirty="0"/>
           </a:p>
@@ -1014,7 +1017,7 @@
           <a:p>
             <a:fld id="{4BE1D723-8F53-4F53-90B0-1982A396982E}" type="datetime1">
               <a:rPr lang="en-US" smtClean="0"/>
-              <a:t>9/22/2019</a:t>
+              <a:t>9/23/19</a:t>
             </a:fld>
             <a:endParaRPr lang="en-US" dirty="0"/>
           </a:p>
@@ -1387,7 +1390,7 @@
           <a:p>
             <a:fld id="{97669AF7-7BEB-44E4-9852-375E34362B5B}" type="datetime1">
               <a:rPr lang="en-US" smtClean="0"/>
-              <a:t>9/22/2019</a:t>
+              <a:t>9/23/19</a:t>
             </a:fld>
             <a:endParaRPr lang="en-US" dirty="0"/>
           </a:p>
@@ -1642,7 +1645,7 @@
           <a:p>
             <a:fld id="{BAAAC38D-0552-4C82-B593-E6124DFADBE2}" type="datetime1">
               <a:rPr lang="en-US" smtClean="0"/>
-              <a:t>9/22/2019</a:t>
+              <a:t>9/23/19</a:t>
             </a:fld>
             <a:endParaRPr lang="en-US" dirty="0"/>
           </a:p>
@@ -2039,7 +2042,7 @@
           <a:p>
             <a:fld id="{D9DF0F1C-5577-4ACB-BB62-DF8F3C494C7E}" type="datetime1">
               <a:rPr lang="en-US" smtClean="0"/>
-              <a:t>9/22/2019</a:t>
+              <a:t>9/23/19</a:t>
             </a:fld>
             <a:endParaRPr lang="en-US" dirty="0"/>
           </a:p>
@@ -2175,7 +2178,7 @@
           <a:p>
             <a:fld id="{1775B394-D9F9-4F0C-B15D-605F45CB9E9F}" type="datetime1">
               <a:rPr lang="en-US" smtClean="0"/>
-              <a:t>9/22/2019</a:t>
+              <a:t>9/23/19</a:t>
             </a:fld>
             <a:endParaRPr lang="en-US" dirty="0"/>
           </a:p>
@@ -2332,7 +2335,7 @@
           <a:p>
             <a:fld id="{39667345-2558-425A-8533-9BFDBCE15005}" type="datetime1">
               <a:rPr lang="en-US" smtClean="0"/>
-              <a:t>9/22/2019</a:t>
+              <a:t>9/23/19</a:t>
             </a:fld>
             <a:endParaRPr lang="en-US" dirty="0"/>
           </a:p>
@@ -2661,7 +2664,7 @@
           <a:p>
             <a:fld id="{92BEA474-078D-4E9B-9B14-09A87B19DC46}" type="datetime1">
               <a:rPr lang="en-US" smtClean="0"/>
-              <a:t>9/22/2019</a:t>
+              <a:t>9/23/19</a:t>
             </a:fld>
             <a:endParaRPr lang="en-US" dirty="0"/>
           </a:p>
@@ -3011,7 +3014,7 @@
           <a:p>
             <a:fld id="{4907D986-8816-4272-A432-0437A28A9828}" type="datetime1">
               <a:rPr lang="en-US" smtClean="0"/>
-              <a:t>9/22/2019</a:t>
+              <a:t>9/23/19</a:t>
             </a:fld>
             <a:endParaRPr lang="en-US" dirty="0"/>
           </a:p>
@@ -3272,7 +3275,7 @@
           <a:p>
             <a:fld id="{62D6E202-B606-4609-B914-27C9371A1F6D}" type="datetime1">
               <a:rPr lang="en-US" smtClean="0"/>
-              <a:t>9/22/2019</a:t>
+              <a:t>9/23/19</a:t>
             </a:fld>
             <a:endParaRPr lang="en-US" dirty="0"/>
           </a:p>
@@ -3999,6 +4002,42 @@
           </a:p>
         </p:txBody>
       </p:sp>
+      <p:pic>
+        <p:nvPicPr>
+          <p:cNvPr id="5" name="Picture 4">
+            <a:extLst>
+              <a:ext uri="{FF2B5EF4-FFF2-40B4-BE49-F238E27FC236}">
+                <a16:creationId xmlns:a16="http://schemas.microsoft.com/office/drawing/2014/main" id="{AB13A218-3679-9C4B-B57C-33B0A23859A8}"/>
+              </a:ext>
+            </a:extLst>
+          </p:cNvPr>
+          <p:cNvPicPr>
+            <a:picLocks noChangeAspect="1"/>
+          </p:cNvPicPr>
+          <p:nvPr/>
+        </p:nvPicPr>
+        <p:blipFill>
+          <a:blip r:embed="rId2">
+            <a:extLst>
+              <a:ext uri="{28A0092B-C50C-407E-A947-70E740481C1C}">
+                <a14:useLocalDpi xmlns:a14="http://schemas.microsoft.com/office/drawing/2010/main" val="0"/>
+              </a:ext>
+            </a:extLst>
+          </a:blip>
+          <a:stretch>
+            <a:fillRect/>
+          </a:stretch>
+        </p:blipFill>
+        <p:spPr>
+          <a:xfrm>
+            <a:off x="10160000" y="4853785"/>
+            <a:ext cx="1514455" cy="1514455"/>
+          </a:xfrm>
+          <a:prstGeom prst="rect">
+            <a:avLst/>
+          </a:prstGeom>
+        </p:spPr>
+      </p:pic>
     </p:spTree>
     <p:extLst>
       <p:ext uri="{BB962C8B-B14F-4D97-AF65-F5344CB8AC3E}">
@@ -4057,8 +4096,8 @@
           </a:p>
         </p:txBody>
       </p:sp>
-      <mc:AlternateContent xmlns:mc="http://schemas.openxmlformats.org/markup-compatibility/2006">
-        <mc:Choice xmlns:a14="http://schemas.microsoft.com/office/drawing/2010/main" Requires="a14">
+      <mc:AlternateContent xmlns:mc="http://schemas.openxmlformats.org/markup-compatibility/2006" xmlns:a14="http://schemas.microsoft.com/office/drawing/2010/main">
+        <mc:Choice Requires="a14">
           <p:sp>
             <p:nvSpPr>
               <p:cNvPr id="4" name="Content Placeholder 2">
@@ -4290,7 +4329,7 @@
                       <m:accPr>
                         <m:chr m:val="⃗"/>
                         <m:ctrlPr>
-                          <a:rPr lang="en-GB" smtClean="0">
+                          <a:rPr lang="en-GB" i="1" smtClean="0">
                             <a:latin typeface="Cambria Math" panose="02040503050406030204" pitchFamily="18" charset="0"/>
                           </a:rPr>
                         </m:ctrlPr>
@@ -4316,7 +4355,7 @@
                     <m:bar>
                       <m:barPr>
                         <m:ctrlPr>
-                          <a:rPr lang="en-GB" b="0" smtClean="0">
+                          <a:rPr lang="en-GB" b="0" i="1" smtClean="0">
                             <a:latin typeface="Cambria Math" panose="02040503050406030204" pitchFamily="18" charset="0"/>
                           </a:rPr>
                         </m:ctrlPr>
@@ -4340,7 +4379,7 @@
             </p:txBody>
           </p:sp>
         </mc:Choice>
-        <mc:Fallback>
+        <mc:Fallback xmlns="">
           <p:sp>
             <p:nvSpPr>
               <p:cNvPr id="4" name="Content Placeholder 2">
@@ -4653,8 +4692,8 @@
           </a:p>
         </p:txBody>
       </p:sp>
-      <mc:AlternateContent xmlns:mc="http://schemas.openxmlformats.org/markup-compatibility/2006">
-        <mc:Choice xmlns:a14="http://schemas.microsoft.com/office/drawing/2010/main" Requires="a14">
+      <mc:AlternateContent xmlns:mc="http://schemas.openxmlformats.org/markup-compatibility/2006" xmlns:a14="http://schemas.microsoft.com/office/drawing/2010/main">
+        <mc:Choice Requires="a14">
           <p:sp>
             <p:nvSpPr>
               <p:cNvPr id="3" name="Content Placeholder 2">
@@ -4909,7 +4948,7 @@
             </p:txBody>
           </p:sp>
         </mc:Choice>
-        <mc:Fallback>
+        <mc:Fallback xmlns="">
           <p:sp>
             <p:nvSpPr>
               <p:cNvPr id="3" name="Content Placeholder 2">
@@ -5634,8 +5673,8 @@
           </a:p>
         </p:txBody>
       </p:sp>
-      <mc:AlternateContent xmlns:mc="http://schemas.openxmlformats.org/markup-compatibility/2006">
-        <mc:Choice xmlns:a14="http://schemas.microsoft.com/office/drawing/2010/main" Requires="a14">
+      <mc:AlternateContent xmlns:mc="http://schemas.openxmlformats.org/markup-compatibility/2006" xmlns:a14="http://schemas.microsoft.com/office/drawing/2010/main">
+        <mc:Choice Requires="a14">
           <p:sp>
             <p:nvSpPr>
               <p:cNvPr id="3" name="Content Placeholder 2">
@@ -5982,7 +6021,7 @@
             </p:txBody>
           </p:sp>
         </mc:Choice>
-        <mc:Fallback>
+        <mc:Fallback xmlns="">
           <p:sp>
             <p:nvSpPr>
               <p:cNvPr id="3" name="Content Placeholder 2">
@@ -6298,8 +6337,8 @@
           </a:p>
         </p:txBody>
       </p:sp>
-      <mc:AlternateContent xmlns:mc="http://schemas.openxmlformats.org/markup-compatibility/2006">
-        <mc:Choice xmlns:a14="http://schemas.microsoft.com/office/drawing/2010/main" Requires="a14">
+      <mc:AlternateContent xmlns:mc="http://schemas.openxmlformats.org/markup-compatibility/2006" xmlns:a14="http://schemas.microsoft.com/office/drawing/2010/main">
+        <mc:Choice Requires="a14">
           <p:sp>
             <p:nvSpPr>
               <p:cNvPr id="20" name="TextBox 19">
@@ -6328,6 +6367,7 @@
               </a:bodyPr>
               <a:lstStyle/>
               <a:p>
+                <a:pPr/>
                 <a14:m>
                   <m:oMathPara xmlns:m="http://schemas.openxmlformats.org/officeDocument/2006/math">
                     <m:oMathParaPr>
@@ -6348,7 +6388,7 @@
             </p:txBody>
           </p:sp>
         </mc:Choice>
-        <mc:Fallback>
+        <mc:Fallback xmlns="">
           <p:sp>
             <p:nvSpPr>
               <p:cNvPr id="20" name="TextBox 19">
@@ -6393,8 +6433,8 @@
           </p:sp>
         </mc:Fallback>
       </mc:AlternateContent>
-      <mc:AlternateContent xmlns:mc="http://schemas.openxmlformats.org/markup-compatibility/2006">
-        <mc:Choice xmlns:a14="http://schemas.microsoft.com/office/drawing/2010/main" Requires="a14">
+      <mc:AlternateContent xmlns:mc="http://schemas.openxmlformats.org/markup-compatibility/2006" xmlns:a14="http://schemas.microsoft.com/office/drawing/2010/main">
+        <mc:Choice Requires="a14">
           <p:sp>
             <p:nvSpPr>
               <p:cNvPr id="4" name="Rectangle 3">
@@ -6422,6 +6462,7 @@
               </a:bodyPr>
               <a:lstStyle/>
               <a:p>
+                <a:pPr/>
                 <a14:m>
                   <m:oMathPara xmlns:m="http://schemas.openxmlformats.org/officeDocument/2006/math">
                     <m:oMathParaPr>
@@ -6455,7 +6496,7 @@
             </p:txBody>
           </p:sp>
         </mc:Choice>
-        <mc:Fallback>
+        <mc:Fallback xmlns="">
           <p:sp>
             <p:nvSpPr>
               <p:cNvPr id="4" name="Rectangle 3">
@@ -6885,8 +6926,8 @@
           </a:p>
         </p:txBody>
       </p:sp>
-      <mc:AlternateContent xmlns:mc="http://schemas.openxmlformats.org/markup-compatibility/2006">
-        <mc:Choice xmlns:a14="http://schemas.microsoft.com/office/drawing/2010/main" Requires="a14">
+      <mc:AlternateContent xmlns:mc="http://schemas.openxmlformats.org/markup-compatibility/2006" xmlns:a14="http://schemas.microsoft.com/office/drawing/2010/main">
+        <mc:Choice Requires="a14">
           <p:sp>
             <p:nvSpPr>
               <p:cNvPr id="3" name="Content Placeholder 2">
@@ -7201,7 +7242,7 @@
             </p:txBody>
           </p:sp>
         </mc:Choice>
-        <mc:Fallback>
+        <mc:Fallback xmlns="">
           <p:sp>
             <p:nvSpPr>
               <p:cNvPr id="3" name="Content Placeholder 2">
@@ -7519,8 +7560,8 @@
           </a:p>
         </p:txBody>
       </p:sp>
-      <mc:AlternateContent xmlns:mc="http://schemas.openxmlformats.org/markup-compatibility/2006">
-        <mc:Choice xmlns:a14="http://schemas.microsoft.com/office/drawing/2010/main" Requires="a14">
+      <mc:AlternateContent xmlns:mc="http://schemas.openxmlformats.org/markup-compatibility/2006" xmlns:a14="http://schemas.microsoft.com/office/drawing/2010/main">
+        <mc:Choice Requires="a14">
           <p:sp>
             <p:nvSpPr>
               <p:cNvPr id="22" name="Content Placeholder 2">
@@ -7832,7 +7873,7 @@
             </p:txBody>
           </p:sp>
         </mc:Choice>
-        <mc:Fallback>
+        <mc:Fallback xmlns="">
           <p:sp>
             <p:nvSpPr>
               <p:cNvPr id="22" name="Content Placeholder 2">
@@ -8401,8 +8442,8 @@
           </a:p>
         </p:txBody>
       </p:sp>
-      <mc:AlternateContent xmlns:mc="http://schemas.openxmlformats.org/markup-compatibility/2006">
-        <mc:Choice xmlns:a14="http://schemas.microsoft.com/office/drawing/2010/main" Requires="a14">
+      <mc:AlternateContent xmlns:mc="http://schemas.openxmlformats.org/markup-compatibility/2006" xmlns:a14="http://schemas.microsoft.com/office/drawing/2010/main">
+        <mc:Choice Requires="a14">
           <p:sp>
             <p:nvSpPr>
               <p:cNvPr id="15" name="Content Placeholder 2">
@@ -8972,7 +9013,7 @@
             </p:txBody>
           </p:sp>
         </mc:Choice>
-        <mc:Fallback>
+        <mc:Fallback xmlns="">
           <p:sp>
             <p:nvSpPr>
               <p:cNvPr id="15" name="Content Placeholder 2">
@@ -10006,8 +10047,8 @@
           </a:p>
         </p:txBody>
       </p:sp>
-      <mc:AlternateContent xmlns:mc="http://schemas.openxmlformats.org/markup-compatibility/2006">
-        <mc:Choice xmlns:a14="http://schemas.microsoft.com/office/drawing/2010/main" Requires="a14">
+      <mc:AlternateContent xmlns:mc="http://schemas.openxmlformats.org/markup-compatibility/2006" xmlns:a14="http://schemas.microsoft.com/office/drawing/2010/main">
+        <mc:Choice Requires="a14">
           <p:sp>
             <p:nvSpPr>
               <p:cNvPr id="15" name="Content Placeholder 2">
@@ -10561,7 +10602,7 @@
                     <m:d>
                       <m:dPr>
                         <m:ctrlPr>
-                          <a:rPr lang="en-GB" b="1" i="0" dirty="0" smtClean="0">
+                          <a:rPr lang="en-GB" b="1" i="1" dirty="0" smtClean="0">
                             <a:latin typeface="Cambria Math" panose="02040503050406030204" pitchFamily="18" charset="0"/>
                           </a:rPr>
                         </m:ctrlPr>
@@ -10594,7 +10635,7 @@
             </p:txBody>
           </p:sp>
         </mc:Choice>
-        <mc:Fallback>
+        <mc:Fallback xmlns="">
           <p:sp>
             <p:nvSpPr>
               <p:cNvPr id="15" name="Content Placeholder 2">
@@ -11328,8 +11369,8 @@
           </a:p>
         </p:txBody>
       </p:sp>
-      <mc:AlternateContent xmlns:mc="http://schemas.openxmlformats.org/markup-compatibility/2006">
-        <mc:Choice xmlns:a14="http://schemas.microsoft.com/office/drawing/2010/main" Requires="a14">
+      <mc:AlternateContent xmlns:mc="http://schemas.openxmlformats.org/markup-compatibility/2006" xmlns:a14="http://schemas.microsoft.com/office/drawing/2010/main">
+        <mc:Choice Requires="a14">
           <p:sp>
             <p:nvSpPr>
               <p:cNvPr id="15" name="Content Placeholder 2">
@@ -11639,7 +11680,7 @@
             </p:txBody>
           </p:sp>
         </mc:Choice>
-        <mc:Fallback>
+        <mc:Fallback xmlns="">
           <p:sp>
             <p:nvSpPr>
               <p:cNvPr id="15" name="Content Placeholder 2">
@@ -12370,8 +12411,8 @@
           </a:p>
         </p:txBody>
       </p:sp>
-      <mc:AlternateContent xmlns:mc="http://schemas.openxmlformats.org/markup-compatibility/2006">
-        <mc:Choice xmlns:a14="http://schemas.microsoft.com/office/drawing/2010/main" Requires="a14">
+      <mc:AlternateContent xmlns:mc="http://schemas.openxmlformats.org/markup-compatibility/2006" xmlns:a14="http://schemas.microsoft.com/office/drawing/2010/main">
+        <mc:Choice Requires="a14">
           <p:sp>
             <p:nvSpPr>
               <p:cNvPr id="15" name="Content Placeholder 2">
@@ -12977,7 +13018,7 @@
             </p:txBody>
           </p:sp>
         </mc:Choice>
-        <mc:Fallback>
+        <mc:Fallback xmlns="">
           <p:sp>
             <p:nvSpPr>
               <p:cNvPr id="15" name="Content Placeholder 2">
@@ -13073,8 +13114,8 @@
           </a:p>
         </p:txBody>
       </p:sp>
-      <mc:AlternateContent xmlns:mc="http://schemas.openxmlformats.org/markup-compatibility/2006">
-        <mc:Choice xmlns:a14="http://schemas.microsoft.com/office/drawing/2010/main" Requires="a14">
+      <mc:AlternateContent xmlns:mc="http://schemas.openxmlformats.org/markup-compatibility/2006" xmlns:a14="http://schemas.microsoft.com/office/drawing/2010/main">
+        <mc:Choice Requires="a14">
           <p:sp>
             <p:nvSpPr>
               <p:cNvPr id="12" name="TextBox 11">
@@ -13103,6 +13144,7 @@
               </a:bodyPr>
               <a:lstStyle/>
               <a:p>
+                <a:pPr/>
                 <a14:m>
                   <m:oMathPara xmlns:m="http://schemas.openxmlformats.org/officeDocument/2006/math">
                     <m:oMathParaPr>
@@ -13123,7 +13165,7 @@
             </p:txBody>
           </p:sp>
         </mc:Choice>
-        <mc:Fallback>
+        <mc:Fallback xmlns="">
           <p:sp>
             <p:nvSpPr>
               <p:cNvPr id="12" name="TextBox 11">

</xml_diff>